<commit_message>
Dodan Arduino kao eksterni uređaj u prezentaciju i .pdf
</commit_message>
<xml_diff>
--- a/Špijunska agencija.pptx
+++ b/Špijunska agencija.pptx
@@ -131,6 +131,11 @@
       </a:defRPr>
     </a:lvl9pPr>
   </p:defaultTextStyle>
+  <p:extLst>
+    <p:ext uri="{EFAFB233-063F-42B5-8137-9DF3F51BA10A}">
+      <p15:sldGuideLst xmlns:p15="http://schemas.microsoft.com/office/powerpoint/2012/main"/>
+    </p:ext>
+  </p:extLst>
 </p:presentation>
 </file>
 
@@ -6881,7 +6886,6 @@
               <a:rPr lang="bs-Latn-BA" dirty="0"/>
               <a:t>bez da naruši/promijeni ponašanja drugih objekata iste klase</a:t>
             </a:r>
-            <a:endParaRPr lang="bs-Latn-BA" dirty="0"/>
           </a:p>
         </p:txBody>
       </p:sp>
@@ -7842,6 +7846,10 @@
           </a:p>
           <a:p>
             <a:pPr lvl="1"/>
+            <a:r>
+              <a:rPr lang="bs-Latn-BA" smtClean="0"/>
+              <a:t>Arduino</a:t>
+            </a:r>
             <a:endParaRPr lang="bs-Latn-BA" dirty="0"/>
           </a:p>
           <a:p>

</xml_diff>

<commit_message>
ispravljene greske u prezentaciji
ispravljeno par typo-a
</commit_message>
<xml_diff>
--- a/Špijunska agencija.pptx
+++ b/Špijunska agencija.pptx
@@ -133,7 +133,7 @@
   </p:defaultTextStyle>
   <p:extLst>
     <p:ext uri="{EFAFB233-063F-42B5-8137-9DF3F51BA10A}">
-      <p15:sldGuideLst xmlns:p15="http://schemas.microsoft.com/office/powerpoint/2012/main"/>
+      <p15:sldGuideLst xmlns="" xmlns:p15="http://schemas.microsoft.com/office/powerpoint/2012/main"/>
     </p:ext>
   </p:extLst>
 </p:presentation>
@@ -6097,7 +6097,7 @@
             </a:r>
             <a:r>
               <a:rPr lang="bs-Latn-BA" sz="1400" dirty="0" smtClean="0"/>
-              <a:t>arik pljevljakivić &amp; </a:t>
+              <a:t>arik pljevljaković &amp; </a:t>
             </a:r>
             <a:r>
               <a:rPr lang="bs-Latn-BA" dirty="0" smtClean="0"/>
@@ -6550,7 +6550,7 @@
           <a:p>
             <a:r>
               <a:rPr lang="bs-Latn-BA" dirty="0" smtClean="0"/>
-              <a:t>Dijagram klasa - MVVN</a:t>
+              <a:t>Dijagram klasa - MVVM</a:t>
             </a:r>
             <a:endParaRPr lang="bs-Latn-BA" dirty="0"/>
           </a:p>
@@ -6711,7 +6711,19 @@
             </a:r>
             <a:r>
               <a:rPr lang="en-GB" dirty="0"/>
-              <a:t> da </a:t>
+              <a:t> </a:t>
+            </a:r>
+            <a:r>
+              <a:rPr lang="en-GB" dirty="0" smtClean="0"/>
+              <a:t>da</a:t>
+            </a:r>
+            <a:r>
+              <a:rPr lang="bs-Latn-BA" dirty="0" smtClean="0"/>
+              <a:t>,</a:t>
+            </a:r>
+            <a:r>
+              <a:rPr lang="en-GB" dirty="0" smtClean="0"/>
+              <a:t> </a:t>
             </a:r>
             <a:r>
               <a:rPr lang="en-GB" dirty="0" err="1"/>
@@ -8712,7 +8724,7 @@
           <a:p>
             <a:r>
               <a:rPr lang="bs-Latn-BA" dirty="0" smtClean="0"/>
-              <a:t>Nakon urađenog Use-Case dijagrama uradili smo scenarije za par mogućih događaja, na slijedećoj slici možete vidjeti jedan od njih.</a:t>
+              <a:t>Nakon urađenog Use-Case dijagrama uradili smo scenarije za par mogućih događaja, na sljedećoj slici možete vidjeti jedan od njih.</a:t>
             </a:r>
             <a:endParaRPr lang="bs-Latn-BA" dirty="0"/>
           </a:p>
@@ -9017,13 +9029,13 @@
           <a:p>
             <a:r>
               <a:rPr lang="bs-Latn-BA" dirty="0" smtClean="0"/>
-              <a:t>Slijedeći zadatak sa kojim smo se susreli bio je pravljenje dijagrama aktivnosti.</a:t>
+              <a:t>Sljedeći zadatak sa kojim smo se susreli bio je pravljenje dijagrama aktivnosti.</a:t>
             </a:r>
           </a:p>
           <a:p>
             <a:r>
               <a:rPr lang="bs-Latn-BA" dirty="0" smtClean="0"/>
-              <a:t>Napravljeni su dijagrami za slijedeć slučajeve:</a:t>
+              <a:t>Napravljeni su dijagrami za sljedeće slučajeve:</a:t>
             </a:r>
           </a:p>
           <a:p>
@@ -9344,7 +9356,7 @@
   <a:extraClrSchemeLst/>
   <a:extLst>
     <a:ext uri="{05A4C25C-085E-4340-85A3-A5531E510DB2}">
-      <thm15:themeFamily xmlns:thm15="http://schemas.microsoft.com/office/thememl/2012/main" name="Ion" id="{B8441ADB-2E43-4AF7-B97A-BD870242C6A8}" vid="{292E63A9-BB86-4E3D-B92A-7223C6510D2E}"/>
+      <thm15:themeFamily xmlns="" xmlns:thm15="http://schemas.microsoft.com/office/thememl/2012/main" name="Ion" id="{B8441ADB-2E43-4AF7-B97A-BD870242C6A8}" vid="{292E63A9-BB86-4E3D-B92A-7223C6510D2E}"/>
     </a:ext>
   </a:extLst>
 </a:theme>

</xml_diff>